<commit_message>
flanker stimulus images are updated
</commit_message>
<xml_diff>
--- a/scripts/experiments/flanker_task/stimuli/stimulus_preparation.pptx
+++ b/scripts/experiments/flanker_task/stimuli/stimulus_preparation.pptx
@@ -6,11 +6,12 @@
   </p:sldMasterIdLst>
   <p:sldIdLst>
     <p:sldId id="256" r:id="rId2"/>
-    <p:sldId id="257" r:id="rId3"/>
-    <p:sldId id="258" r:id="rId4"/>
-    <p:sldId id="259" r:id="rId5"/>
-    <p:sldId id="260" r:id="rId6"/>
-    <p:sldId id="261" r:id="rId7"/>
+    <p:sldId id="262" r:id="rId3"/>
+    <p:sldId id="257" r:id="rId4"/>
+    <p:sldId id="258" r:id="rId5"/>
+    <p:sldId id="259" r:id="rId6"/>
+    <p:sldId id="260" r:id="rId7"/>
+    <p:sldId id="261" r:id="rId8"/>
   </p:sldIdLst>
   <p:sldSz cx="12192000" cy="6858000"/>
   <p:notesSz cx="6858000" cy="9144000"/>
@@ -109,6 +110,11 @@
       </a:defRPr>
     </a:lvl9pPr>
   </p:defaultTextStyle>
+  <p:extLst>
+    <p:ext uri="{EFAFB233-063F-42B5-8137-9DF3F51BA10A}">
+      <p15:sldGuideLst xmlns:p15="http://schemas.microsoft.com/office/powerpoint/2012/main"/>
+    </p:ext>
+  </p:extLst>
 </p:presentation>
 </file>
 
@@ -259,7 +265,7 @@
           <a:p>
             <a:fld id="{5622E410-FD8D-4C32-ACF8-71F1054262BD}" type="datetimeFigureOut">
               <a:rPr lang="en-US" smtClean="0"/>
-              <a:t>2/24/2023</a:t>
+              <a:t>3/20/2023</a:t>
             </a:fld>
             <a:endParaRPr lang="en-US"/>
           </a:p>
@@ -329,6 +335,13 @@
   <p:clrMapOvr>
     <a:masterClrMapping/>
   </p:clrMapOvr>
+  <p:timing>
+    <p:tnLst>
+      <p:par>
+        <p:cTn id="1" dur="indefinite" restart="never" nodeType="tmRoot"/>
+      </p:par>
+    </p:tnLst>
+  </p:timing>
 </p:sldLayout>
 </file>
 
@@ -457,7 +470,7 @@
           <a:p>
             <a:fld id="{5622E410-FD8D-4C32-ACF8-71F1054262BD}" type="datetimeFigureOut">
               <a:rPr lang="en-US" smtClean="0"/>
-              <a:t>2/24/2023</a:t>
+              <a:t>3/20/2023</a:t>
             </a:fld>
             <a:endParaRPr lang="en-US"/>
           </a:p>
@@ -665,7 +678,7 @@
           <a:p>
             <a:fld id="{5622E410-FD8D-4C32-ACF8-71F1054262BD}" type="datetimeFigureOut">
               <a:rPr lang="en-US" smtClean="0"/>
-              <a:t>2/24/2023</a:t>
+              <a:t>3/20/2023</a:t>
             </a:fld>
             <a:endParaRPr lang="en-US"/>
           </a:p>
@@ -863,7 +876,7 @@
           <a:p>
             <a:fld id="{5622E410-FD8D-4C32-ACF8-71F1054262BD}" type="datetimeFigureOut">
               <a:rPr lang="en-US" smtClean="0"/>
-              <a:t>2/24/2023</a:t>
+              <a:t>3/20/2023</a:t>
             </a:fld>
             <a:endParaRPr lang="en-US"/>
           </a:p>
@@ -1138,7 +1151,7 @@
           <a:p>
             <a:fld id="{5622E410-FD8D-4C32-ACF8-71F1054262BD}" type="datetimeFigureOut">
               <a:rPr lang="en-US" smtClean="0"/>
-              <a:t>2/24/2023</a:t>
+              <a:t>3/20/2023</a:t>
             </a:fld>
             <a:endParaRPr lang="en-US"/>
           </a:p>
@@ -1403,7 +1416,7 @@
           <a:p>
             <a:fld id="{5622E410-FD8D-4C32-ACF8-71F1054262BD}" type="datetimeFigureOut">
               <a:rPr lang="en-US" smtClean="0"/>
-              <a:t>2/24/2023</a:t>
+              <a:t>3/20/2023</a:t>
             </a:fld>
             <a:endParaRPr lang="en-US"/>
           </a:p>
@@ -1815,7 +1828,7 @@
           <a:p>
             <a:fld id="{5622E410-FD8D-4C32-ACF8-71F1054262BD}" type="datetimeFigureOut">
               <a:rPr lang="en-US" smtClean="0"/>
-              <a:t>2/24/2023</a:t>
+              <a:t>3/20/2023</a:t>
             </a:fld>
             <a:endParaRPr lang="en-US"/>
           </a:p>
@@ -1956,7 +1969,7 @@
           <a:p>
             <a:fld id="{5622E410-FD8D-4C32-ACF8-71F1054262BD}" type="datetimeFigureOut">
               <a:rPr lang="en-US" smtClean="0"/>
-              <a:t>2/24/2023</a:t>
+              <a:t>3/20/2023</a:t>
             </a:fld>
             <a:endParaRPr lang="en-US"/>
           </a:p>
@@ -2069,7 +2082,7 @@
           <a:p>
             <a:fld id="{5622E410-FD8D-4C32-ACF8-71F1054262BD}" type="datetimeFigureOut">
               <a:rPr lang="en-US" smtClean="0"/>
-              <a:t>2/24/2023</a:t>
+              <a:t>3/20/2023</a:t>
             </a:fld>
             <a:endParaRPr lang="en-US"/>
           </a:p>
@@ -2380,7 +2393,7 @@
           <a:p>
             <a:fld id="{5622E410-FD8D-4C32-ACF8-71F1054262BD}" type="datetimeFigureOut">
               <a:rPr lang="en-US" smtClean="0"/>
-              <a:t>2/24/2023</a:t>
+              <a:t>3/20/2023</a:t>
             </a:fld>
             <a:endParaRPr lang="en-US"/>
           </a:p>
@@ -2668,7 +2681,7 @@
           <a:p>
             <a:fld id="{5622E410-FD8D-4C32-ACF8-71F1054262BD}" type="datetimeFigureOut">
               <a:rPr lang="en-US" smtClean="0"/>
-              <a:t>2/24/2023</a:t>
+              <a:t>3/20/2023</a:t>
             </a:fld>
             <a:endParaRPr lang="en-US"/>
           </a:p>
@@ -2745,9 +2758,12 @@
 <p:sldMaster xmlns:a="http://schemas.openxmlformats.org/drawingml/2006/main" xmlns:r="http://schemas.openxmlformats.org/officeDocument/2006/relationships" xmlns:p="http://schemas.openxmlformats.org/presentationml/2006/main">
   <p:cSld>
     <p:bg>
-      <p:bgRef idx="1001">
-        <a:schemeClr val="bg1"/>
-      </p:bgRef>
+      <p:bgPr>
+        <a:solidFill>
+          <a:srgbClr val="BFBDBD"/>
+        </a:solidFill>
+        <a:effectLst/>
+      </p:bgPr>
     </p:bg>
     <p:spTree>
       <p:nvGrpSpPr>
@@ -2909,7 +2925,7 @@
           <a:p>
             <a:fld id="{5622E410-FD8D-4C32-ACF8-71F1054262BD}" type="datetimeFigureOut">
               <a:rPr lang="en-US" smtClean="0"/>
-              <a:t>2/24/2023</a:t>
+              <a:t>3/20/2023</a:t>
             </a:fld>
             <a:endParaRPr lang="en-US"/>
           </a:p>
@@ -3326,69 +3342,6 @@
           <a:chExt cx="0" cy="0"/>
         </a:xfrm>
       </p:grpSpPr>
-      <p:sp>
-        <p:nvSpPr>
-          <p:cNvPr id="4" name="Rectangle 3">
-            <a:extLst>
-              <a:ext uri="{FF2B5EF4-FFF2-40B4-BE49-F238E27FC236}">
-                <a16:creationId xmlns:a16="http://schemas.microsoft.com/office/drawing/2014/main" id="{3ADA0A83-4B6D-9F5C-D212-7B72D8F87978}"/>
-              </a:ext>
-            </a:extLst>
-          </p:cNvPr>
-          <p:cNvSpPr/>
-          <p:nvPr/>
-        </p:nvSpPr>
-        <p:spPr>
-          <a:xfrm>
-            <a:off x="3086470" y="2190565"/>
-            <a:ext cx="6019060" cy="2476870"/>
-          </a:xfrm>
-          <a:prstGeom prst="rect">
-            <a:avLst/>
-          </a:prstGeom>
-          <a:solidFill>
-            <a:schemeClr val="bg1"/>
-          </a:solidFill>
-          <a:ln>
-            <a:solidFill>
-              <a:schemeClr val="bg1"/>
-            </a:solidFill>
-          </a:ln>
-        </p:spPr>
-        <p:style>
-          <a:lnRef idx="2">
-            <a:schemeClr val="accent1">
-              <a:shade val="50000"/>
-            </a:schemeClr>
-          </a:lnRef>
-          <a:fillRef idx="1">
-            <a:schemeClr val="accent1"/>
-          </a:fillRef>
-          <a:effectRef idx="0">
-            <a:schemeClr val="accent1"/>
-          </a:effectRef>
-          <a:fontRef idx="minor">
-            <a:schemeClr val="lt1"/>
-          </a:fontRef>
-        </p:style>
-        <p:txBody>
-          <a:bodyPr rtlCol="0" anchor="ctr"/>
-          <a:lstStyle/>
-          <a:p>
-            <a:pPr algn="ctr"/>
-            <a:r>
-              <a:rPr lang="en-US" sz="8000" dirty="0">
-                <a:solidFill>
-                  <a:schemeClr val="tx1"/>
-                </a:solidFill>
-                <a:latin typeface="Helvetica" panose="020B0604020202020204" pitchFamily="34" charset="0"/>
-                <a:cs typeface="Helvetica" panose="020B0604020202020204" pitchFamily="34" charset="0"/>
-              </a:rPr>
-              <a:t>&lt;&lt;&lt;&lt;&lt;</a:t>
-            </a:r>
-          </a:p>
-        </p:txBody>
-      </p:sp>
     </p:spTree>
     <p:extLst>
       <p:ext uri="{BB962C8B-B14F-4D97-AF65-F5344CB8AC3E}">
@@ -3399,6 +3352,13 @@
   <p:clrMapOvr>
     <a:masterClrMapping/>
   </p:clrMapOvr>
+  <p:timing>
+    <p:tnLst>
+      <p:par>
+        <p:cTn id="1" dur="indefinite" restart="never" nodeType="tmRoot"/>
+      </p:par>
+    </p:tnLst>
+  </p:timing>
 </p:sld>
 </file>
 
@@ -3421,10 +3381,10 @@
       </p:grpSpPr>
       <p:sp>
         <p:nvSpPr>
-          <p:cNvPr id="2" name="Rectangle 1">
-            <a:extLst>
-              <a:ext uri="{FF2B5EF4-FFF2-40B4-BE49-F238E27FC236}">
-                <a16:creationId xmlns:a16="http://schemas.microsoft.com/office/drawing/2014/main" id="{55952CB0-2E38-B52B-3364-74D0EEF2753B}"/>
+          <p:cNvPr id="4" name="Rectangle 3">
+            <a:extLst>
+              <a:ext uri="{FF2B5EF4-FFF2-40B4-BE49-F238E27FC236}">
+                <a16:creationId xmlns:a16="http://schemas.microsoft.com/office/drawing/2014/main" id="{3ADA0A83-4B6D-9F5C-D212-7B72D8F87978}"/>
               </a:ext>
             </a:extLst>
           </p:cNvPr>
@@ -3440,12 +3400,10 @@
             <a:avLst/>
           </a:prstGeom>
           <a:solidFill>
-            <a:schemeClr val="bg1"/>
+            <a:srgbClr val="BFBDBD"/>
           </a:solidFill>
           <a:ln>
-            <a:solidFill>
-              <a:schemeClr val="bg1"/>
-            </a:solidFill>
+            <a:noFill/>
           </a:ln>
         </p:spPr>
         <p:style>
@@ -3470,14 +3428,14 @@
           <a:p>
             <a:pPr algn="ctr"/>
             <a:r>
-              <a:rPr lang="en-US" sz="8000" dirty="0">
+              <a:rPr lang="en-US" sz="8000" spc="600" dirty="0">
                 <a:solidFill>
                   <a:schemeClr val="tx1"/>
                 </a:solidFill>
                 <a:latin typeface="Helvetica" panose="020B0604020202020204" pitchFamily="34" charset="0"/>
                 <a:cs typeface="Helvetica" panose="020B0604020202020204" pitchFamily="34" charset="0"/>
               </a:rPr>
-              <a:t>&gt;&gt;&gt;&gt;&gt;</a:t>
+              <a:t>&lt;&lt;&lt;&lt;&lt;</a:t>
             </a:r>
           </a:p>
         </p:txBody>
@@ -3485,13 +3443,20 @@
     </p:spTree>
     <p:extLst>
       <p:ext uri="{BB962C8B-B14F-4D97-AF65-F5344CB8AC3E}">
-        <p14:creationId xmlns:p14="http://schemas.microsoft.com/office/powerpoint/2010/main" val="557106942"/>
+        <p14:creationId xmlns:p14="http://schemas.microsoft.com/office/powerpoint/2010/main" val="1001664424"/>
       </p:ext>
     </p:extLst>
   </p:cSld>
   <p:clrMapOvr>
     <a:masterClrMapping/>
   </p:clrMapOvr>
+  <p:timing>
+    <p:tnLst>
+      <p:par>
+        <p:cTn id="1" dur="indefinite" restart="never" nodeType="tmRoot"/>
+      </p:par>
+    </p:tnLst>
+  </p:timing>
 </p:sld>
 </file>
 
@@ -3533,12 +3498,10 @@
             <a:avLst/>
           </a:prstGeom>
           <a:solidFill>
-            <a:schemeClr val="bg1"/>
+            <a:srgbClr val="BFBDBD"/>
           </a:solidFill>
           <a:ln>
-            <a:solidFill>
-              <a:schemeClr val="bg1"/>
-            </a:solidFill>
+            <a:noFill/>
           </a:ln>
         </p:spPr>
         <p:style>
@@ -3563,14 +3526,14 @@
           <a:p>
             <a:pPr algn="ctr"/>
             <a:r>
-              <a:rPr lang="en-US" sz="8000" dirty="0">
+              <a:rPr lang="en-US" sz="8000" spc="600" dirty="0">
                 <a:solidFill>
                   <a:schemeClr val="tx1"/>
                 </a:solidFill>
                 <a:latin typeface="Helvetica" panose="020B0604020202020204" pitchFamily="34" charset="0"/>
                 <a:cs typeface="Helvetica" panose="020B0604020202020204" pitchFamily="34" charset="0"/>
               </a:rPr>
-              <a:t>&gt;&gt;&lt;&gt;&gt;</a:t>
+              <a:t>&gt;&gt;&gt;&gt;&gt;</a:t>
             </a:r>
           </a:p>
         </p:txBody>
@@ -3578,13 +3541,20 @@
     </p:spTree>
     <p:extLst>
       <p:ext uri="{BB962C8B-B14F-4D97-AF65-F5344CB8AC3E}">
-        <p14:creationId xmlns:p14="http://schemas.microsoft.com/office/powerpoint/2010/main" val="1538526052"/>
+        <p14:creationId xmlns:p14="http://schemas.microsoft.com/office/powerpoint/2010/main" val="557106942"/>
       </p:ext>
     </p:extLst>
   </p:cSld>
   <p:clrMapOvr>
     <a:masterClrMapping/>
   </p:clrMapOvr>
+  <p:timing>
+    <p:tnLst>
+      <p:par>
+        <p:cTn id="1" dur="indefinite" restart="never" nodeType="tmRoot"/>
+      </p:par>
+    </p:tnLst>
+  </p:timing>
 </p:sld>
 </file>
 
@@ -3626,12 +3596,10 @@
             <a:avLst/>
           </a:prstGeom>
           <a:solidFill>
-            <a:schemeClr val="bg1"/>
+            <a:srgbClr val="BFBDBD"/>
           </a:solidFill>
           <a:ln>
-            <a:solidFill>
-              <a:schemeClr val="bg1"/>
-            </a:solidFill>
+            <a:noFill/>
           </a:ln>
         </p:spPr>
         <p:style>
@@ -3656,14 +3624,14 @@
           <a:p>
             <a:pPr algn="ctr"/>
             <a:r>
-              <a:rPr lang="en-US" sz="8000" dirty="0">
+              <a:rPr lang="en-US" sz="8000" spc="600" dirty="0">
                 <a:solidFill>
                   <a:schemeClr val="tx1"/>
                 </a:solidFill>
                 <a:latin typeface="Helvetica" panose="020B0604020202020204" pitchFamily="34" charset="0"/>
                 <a:cs typeface="Helvetica" panose="020B0604020202020204" pitchFamily="34" charset="0"/>
               </a:rPr>
-              <a:t>&lt;&lt;&gt;&lt;&lt;</a:t>
+              <a:t>&gt;&gt;&lt;&gt;&gt;</a:t>
             </a:r>
           </a:p>
         </p:txBody>
@@ -3671,13 +3639,20 @@
     </p:spTree>
     <p:extLst>
       <p:ext uri="{BB962C8B-B14F-4D97-AF65-F5344CB8AC3E}">
-        <p14:creationId xmlns:p14="http://schemas.microsoft.com/office/powerpoint/2010/main" val="742953238"/>
+        <p14:creationId xmlns:p14="http://schemas.microsoft.com/office/powerpoint/2010/main" val="1538526052"/>
       </p:ext>
     </p:extLst>
   </p:cSld>
   <p:clrMapOvr>
     <a:masterClrMapping/>
   </p:clrMapOvr>
+  <p:timing>
+    <p:tnLst>
+      <p:par>
+        <p:cTn id="1" dur="indefinite" restart="never" nodeType="tmRoot"/>
+      </p:par>
+    </p:tnLst>
+  </p:timing>
 </p:sld>
 </file>
 
@@ -3719,12 +3694,10 @@
             <a:avLst/>
           </a:prstGeom>
           <a:solidFill>
-            <a:schemeClr val="bg1"/>
+            <a:srgbClr val="BFBDBD"/>
           </a:solidFill>
           <a:ln>
-            <a:solidFill>
-              <a:schemeClr val="bg1"/>
-            </a:solidFill>
+            <a:noFill/>
           </a:ln>
         </p:spPr>
         <p:style>
@@ -3749,14 +3722,14 @@
           <a:p>
             <a:pPr algn="ctr"/>
             <a:r>
-              <a:rPr lang="en-US" sz="8000" dirty="0">
+              <a:rPr lang="en-US" sz="8000" spc="600" dirty="0">
                 <a:solidFill>
                   <a:schemeClr val="tx1"/>
                 </a:solidFill>
                 <a:latin typeface="Helvetica" panose="020B0604020202020204" pitchFamily="34" charset="0"/>
                 <a:cs typeface="Helvetica" panose="020B0604020202020204" pitchFamily="34" charset="0"/>
               </a:rPr>
-              <a:t>++&gt;++</a:t>
+              <a:t>&lt;&lt;&gt;&lt;&lt;</a:t>
             </a:r>
           </a:p>
         </p:txBody>
@@ -3764,13 +3737,20 @@
     </p:spTree>
     <p:extLst>
       <p:ext uri="{BB962C8B-B14F-4D97-AF65-F5344CB8AC3E}">
-        <p14:creationId xmlns:p14="http://schemas.microsoft.com/office/powerpoint/2010/main" val="562114955"/>
+        <p14:creationId xmlns:p14="http://schemas.microsoft.com/office/powerpoint/2010/main" val="742953238"/>
       </p:ext>
     </p:extLst>
   </p:cSld>
   <p:clrMapOvr>
     <a:masterClrMapping/>
   </p:clrMapOvr>
+  <p:timing>
+    <p:tnLst>
+      <p:par>
+        <p:cTn id="1" dur="indefinite" restart="never" nodeType="tmRoot"/>
+      </p:par>
+    </p:tnLst>
+  </p:timing>
 </p:sld>
 </file>
 
@@ -3812,12 +3792,10 @@
             <a:avLst/>
           </a:prstGeom>
           <a:solidFill>
-            <a:schemeClr val="bg1"/>
+            <a:srgbClr val="BFBDBD"/>
           </a:solidFill>
           <a:ln>
-            <a:solidFill>
-              <a:schemeClr val="bg1"/>
-            </a:solidFill>
+            <a:noFill/>
           </a:ln>
         </p:spPr>
         <p:style>
@@ -3842,7 +3820,105 @@
           <a:p>
             <a:pPr algn="ctr"/>
             <a:r>
-              <a:rPr lang="en-US" sz="8000" dirty="0">
+              <a:rPr lang="en-US" sz="8000" spc="600" dirty="0">
+                <a:solidFill>
+                  <a:schemeClr val="tx1"/>
+                </a:solidFill>
+                <a:latin typeface="Helvetica" panose="020B0604020202020204" pitchFamily="34" charset="0"/>
+                <a:cs typeface="Helvetica" panose="020B0604020202020204" pitchFamily="34" charset="0"/>
+              </a:rPr>
+              <a:t>++&gt;++</a:t>
+            </a:r>
+          </a:p>
+        </p:txBody>
+      </p:sp>
+    </p:spTree>
+    <p:extLst>
+      <p:ext uri="{BB962C8B-B14F-4D97-AF65-F5344CB8AC3E}">
+        <p14:creationId xmlns:p14="http://schemas.microsoft.com/office/powerpoint/2010/main" val="562114955"/>
+      </p:ext>
+    </p:extLst>
+  </p:cSld>
+  <p:clrMapOvr>
+    <a:masterClrMapping/>
+  </p:clrMapOvr>
+  <p:timing>
+    <p:tnLst>
+      <p:par>
+        <p:cTn id="1" dur="indefinite" restart="never" nodeType="tmRoot"/>
+      </p:par>
+    </p:tnLst>
+  </p:timing>
+</p:sld>
+</file>
+
+<file path=ppt/slides/slide7.xml><?xml version="1.0" encoding="utf-8"?>
+<p:sld xmlns:a="http://schemas.openxmlformats.org/drawingml/2006/main" xmlns:r="http://schemas.openxmlformats.org/officeDocument/2006/relationships" xmlns:p="http://schemas.openxmlformats.org/presentationml/2006/main">
+  <p:cSld>
+    <p:spTree>
+      <p:nvGrpSpPr>
+        <p:cNvPr id="1" name=""/>
+        <p:cNvGrpSpPr/>
+        <p:nvPr/>
+      </p:nvGrpSpPr>
+      <p:grpSpPr>
+        <a:xfrm>
+          <a:off x="0" y="0"/>
+          <a:ext cx="0" cy="0"/>
+          <a:chOff x="0" y="0"/>
+          <a:chExt cx="0" cy="0"/>
+        </a:xfrm>
+      </p:grpSpPr>
+      <p:sp>
+        <p:nvSpPr>
+          <p:cNvPr id="2" name="Rectangle 1">
+            <a:extLst>
+              <a:ext uri="{FF2B5EF4-FFF2-40B4-BE49-F238E27FC236}">
+                <a16:creationId xmlns:a16="http://schemas.microsoft.com/office/drawing/2014/main" id="{55952CB0-2E38-B52B-3364-74D0EEF2753B}"/>
+              </a:ext>
+            </a:extLst>
+          </p:cNvPr>
+          <p:cNvSpPr/>
+          <p:nvPr/>
+        </p:nvSpPr>
+        <p:spPr>
+          <a:xfrm>
+            <a:off x="3086470" y="2190565"/>
+            <a:ext cx="6019060" cy="2476870"/>
+          </a:xfrm>
+          <a:prstGeom prst="rect">
+            <a:avLst/>
+          </a:prstGeom>
+          <a:solidFill>
+            <a:srgbClr val="BFBDBD"/>
+          </a:solidFill>
+          <a:ln>
+            <a:noFill/>
+          </a:ln>
+        </p:spPr>
+        <p:style>
+          <a:lnRef idx="2">
+            <a:schemeClr val="accent1">
+              <a:shade val="50000"/>
+            </a:schemeClr>
+          </a:lnRef>
+          <a:fillRef idx="1">
+            <a:schemeClr val="accent1"/>
+          </a:fillRef>
+          <a:effectRef idx="0">
+            <a:schemeClr val="accent1"/>
+          </a:effectRef>
+          <a:fontRef idx="minor">
+            <a:schemeClr val="lt1"/>
+          </a:fontRef>
+        </p:style>
+        <p:txBody>
+          <a:bodyPr rtlCol="0" anchor="ctr"/>
+          <a:lstStyle/>
+          <a:p>
+            <a:pPr algn="ctr"/>
+            <a:r>
+              <a:rPr lang="en-US" sz="8000" spc="600" dirty="0">
                 <a:solidFill>
                   <a:schemeClr val="tx1"/>
                 </a:solidFill>
@@ -3864,6 +3940,13 @@
   <p:clrMapOvr>
     <a:masterClrMapping/>
   </p:clrMapOvr>
+  <p:timing>
+    <p:tnLst>
+      <p:par>
+        <p:cTn id="1" dur="indefinite" restart="never" nodeType="tmRoot"/>
+      </p:par>
+    </p:tnLst>
+  </p:timing>
 </p:sld>
 </file>
 

</xml_diff>

<commit_message>
update scripts 30/05/2023 ocd flanker analyses
</commit_message>
<xml_diff>
--- a/scripts/experiments/flanker_task/stimuli/stimulus_preparation.pptx
+++ b/scripts/experiments/flanker_task/stimuli/stimulus_preparation.pptx
@@ -6,12 +6,13 @@
   </p:sldMasterIdLst>
   <p:sldIdLst>
     <p:sldId id="256" r:id="rId2"/>
-    <p:sldId id="262" r:id="rId3"/>
-    <p:sldId id="257" r:id="rId4"/>
-    <p:sldId id="258" r:id="rId5"/>
-    <p:sldId id="259" r:id="rId6"/>
-    <p:sldId id="260" r:id="rId7"/>
-    <p:sldId id="261" r:id="rId8"/>
+    <p:sldId id="263" r:id="rId3"/>
+    <p:sldId id="262" r:id="rId4"/>
+    <p:sldId id="257" r:id="rId5"/>
+    <p:sldId id="258" r:id="rId6"/>
+    <p:sldId id="259" r:id="rId7"/>
+    <p:sldId id="260" r:id="rId8"/>
+    <p:sldId id="261" r:id="rId9"/>
   </p:sldIdLst>
   <p:sldSz cx="12192000" cy="6858000"/>
   <p:notesSz cx="6858000" cy="9144000"/>
@@ -265,7 +266,7 @@
           <a:p>
             <a:fld id="{5622E410-FD8D-4C32-ACF8-71F1054262BD}" type="datetimeFigureOut">
               <a:rPr lang="en-US" smtClean="0"/>
-              <a:t>3/20/2023</a:t>
+              <a:t>4/19/2023</a:t>
             </a:fld>
             <a:endParaRPr lang="en-US"/>
           </a:p>
@@ -470,7 +471,7 @@
           <a:p>
             <a:fld id="{5622E410-FD8D-4C32-ACF8-71F1054262BD}" type="datetimeFigureOut">
               <a:rPr lang="en-US" smtClean="0"/>
-              <a:t>3/20/2023</a:t>
+              <a:t>4/19/2023</a:t>
             </a:fld>
             <a:endParaRPr lang="en-US"/>
           </a:p>
@@ -678,7 +679,7 @@
           <a:p>
             <a:fld id="{5622E410-FD8D-4C32-ACF8-71F1054262BD}" type="datetimeFigureOut">
               <a:rPr lang="en-US" smtClean="0"/>
-              <a:t>3/20/2023</a:t>
+              <a:t>4/19/2023</a:t>
             </a:fld>
             <a:endParaRPr lang="en-US"/>
           </a:p>
@@ -876,7 +877,7 @@
           <a:p>
             <a:fld id="{5622E410-FD8D-4C32-ACF8-71F1054262BD}" type="datetimeFigureOut">
               <a:rPr lang="en-US" smtClean="0"/>
-              <a:t>3/20/2023</a:t>
+              <a:t>4/19/2023</a:t>
             </a:fld>
             <a:endParaRPr lang="en-US"/>
           </a:p>
@@ -1151,7 +1152,7 @@
           <a:p>
             <a:fld id="{5622E410-FD8D-4C32-ACF8-71F1054262BD}" type="datetimeFigureOut">
               <a:rPr lang="en-US" smtClean="0"/>
-              <a:t>3/20/2023</a:t>
+              <a:t>4/19/2023</a:t>
             </a:fld>
             <a:endParaRPr lang="en-US"/>
           </a:p>
@@ -1416,7 +1417,7 @@
           <a:p>
             <a:fld id="{5622E410-FD8D-4C32-ACF8-71F1054262BD}" type="datetimeFigureOut">
               <a:rPr lang="en-US" smtClean="0"/>
-              <a:t>3/20/2023</a:t>
+              <a:t>4/19/2023</a:t>
             </a:fld>
             <a:endParaRPr lang="en-US"/>
           </a:p>
@@ -1828,7 +1829,7 @@
           <a:p>
             <a:fld id="{5622E410-FD8D-4C32-ACF8-71F1054262BD}" type="datetimeFigureOut">
               <a:rPr lang="en-US" smtClean="0"/>
-              <a:t>3/20/2023</a:t>
+              <a:t>4/19/2023</a:t>
             </a:fld>
             <a:endParaRPr lang="en-US"/>
           </a:p>
@@ -1969,7 +1970,7 @@
           <a:p>
             <a:fld id="{5622E410-FD8D-4C32-ACF8-71F1054262BD}" type="datetimeFigureOut">
               <a:rPr lang="en-US" smtClean="0"/>
-              <a:t>3/20/2023</a:t>
+              <a:t>4/19/2023</a:t>
             </a:fld>
             <a:endParaRPr lang="en-US"/>
           </a:p>
@@ -2082,7 +2083,7 @@
           <a:p>
             <a:fld id="{5622E410-FD8D-4C32-ACF8-71F1054262BD}" type="datetimeFigureOut">
               <a:rPr lang="en-US" smtClean="0"/>
-              <a:t>3/20/2023</a:t>
+              <a:t>4/19/2023</a:t>
             </a:fld>
             <a:endParaRPr lang="en-US"/>
           </a:p>
@@ -2393,7 +2394,7 @@
           <a:p>
             <a:fld id="{5622E410-FD8D-4C32-ACF8-71F1054262BD}" type="datetimeFigureOut">
               <a:rPr lang="en-US" smtClean="0"/>
-              <a:t>3/20/2023</a:t>
+              <a:t>4/19/2023</a:t>
             </a:fld>
             <a:endParaRPr lang="en-US"/>
           </a:p>
@@ -2681,7 +2682,7 @@
           <a:p>
             <a:fld id="{5622E410-FD8D-4C32-ACF8-71F1054262BD}" type="datetimeFigureOut">
               <a:rPr lang="en-US" smtClean="0"/>
-              <a:t>3/20/2023</a:t>
+              <a:t>4/19/2023</a:t>
             </a:fld>
             <a:endParaRPr lang="en-US"/>
           </a:p>
@@ -2925,7 +2926,7 @@
           <a:p>
             <a:fld id="{5622E410-FD8D-4C32-ACF8-71F1054262BD}" type="datetimeFigureOut">
               <a:rPr lang="en-US" smtClean="0"/>
-              <a:t>3/20/2023</a:t>
+              <a:t>4/19/2023</a:t>
             </a:fld>
             <a:endParaRPr lang="en-US"/>
           </a:p>
@@ -3428,22 +3429,29 @@
           <a:p>
             <a:pPr algn="ctr"/>
             <a:r>
-              <a:rPr lang="en-US" sz="8000" spc="600" dirty="0">
+              <a:rPr lang="en-US" sz="8000" spc="600" dirty="0" smtClean="0">
                 <a:solidFill>
                   <a:schemeClr val="tx1"/>
                 </a:solidFill>
                 <a:latin typeface="Helvetica" panose="020B0604020202020204" pitchFamily="34" charset="0"/>
                 <a:cs typeface="Helvetica" panose="020B0604020202020204" pitchFamily="34" charset="0"/>
               </a:rPr>
-              <a:t>&lt;&lt;&lt;&lt;&lt;</a:t>
-            </a:r>
+              <a:t>+</a:t>
+            </a:r>
+            <a:endParaRPr lang="en-US" sz="8000" spc="600" dirty="0">
+              <a:solidFill>
+                <a:schemeClr val="tx1"/>
+              </a:solidFill>
+              <a:latin typeface="Helvetica" panose="020B0604020202020204" pitchFamily="34" charset="0"/>
+              <a:cs typeface="Helvetica" panose="020B0604020202020204" pitchFamily="34" charset="0"/>
+            </a:endParaRPr>
           </a:p>
         </p:txBody>
       </p:sp>
     </p:spTree>
     <p:extLst>
       <p:ext uri="{BB962C8B-B14F-4D97-AF65-F5344CB8AC3E}">
-        <p14:creationId xmlns:p14="http://schemas.microsoft.com/office/powerpoint/2010/main" val="1001664424"/>
+        <p14:creationId xmlns:p14="http://schemas.microsoft.com/office/powerpoint/2010/main" val="587928548"/>
       </p:ext>
     </p:extLst>
   </p:cSld>
@@ -3479,10 +3487,10 @@
       </p:grpSpPr>
       <p:sp>
         <p:nvSpPr>
-          <p:cNvPr id="2" name="Rectangle 1">
-            <a:extLst>
-              <a:ext uri="{FF2B5EF4-FFF2-40B4-BE49-F238E27FC236}">
-                <a16:creationId xmlns:a16="http://schemas.microsoft.com/office/drawing/2014/main" id="{55952CB0-2E38-B52B-3364-74D0EEF2753B}"/>
+          <p:cNvPr id="4" name="Rectangle 3">
+            <a:extLst>
+              <a:ext uri="{FF2B5EF4-FFF2-40B4-BE49-F238E27FC236}">
+                <a16:creationId xmlns:a16="http://schemas.microsoft.com/office/drawing/2014/main" id="{3ADA0A83-4B6D-9F5C-D212-7B72D8F87978}"/>
               </a:ext>
             </a:extLst>
           </p:cNvPr>
@@ -3533,7 +3541,7 @@
                 <a:latin typeface="Helvetica" panose="020B0604020202020204" pitchFamily="34" charset="0"/>
                 <a:cs typeface="Helvetica" panose="020B0604020202020204" pitchFamily="34" charset="0"/>
               </a:rPr>
-              <a:t>&gt;&gt;&gt;&gt;&gt;</a:t>
+              <a:t>&lt;&lt;&lt;&lt;&lt;</a:t>
             </a:r>
           </a:p>
         </p:txBody>
@@ -3541,7 +3549,7 @@
     </p:spTree>
     <p:extLst>
       <p:ext uri="{BB962C8B-B14F-4D97-AF65-F5344CB8AC3E}">
-        <p14:creationId xmlns:p14="http://schemas.microsoft.com/office/powerpoint/2010/main" val="557106942"/>
+        <p14:creationId xmlns:p14="http://schemas.microsoft.com/office/powerpoint/2010/main" val="1001664424"/>
       </p:ext>
     </p:extLst>
   </p:cSld>
@@ -3631,7 +3639,7 @@
                 <a:latin typeface="Helvetica" panose="020B0604020202020204" pitchFamily="34" charset="0"/>
                 <a:cs typeface="Helvetica" panose="020B0604020202020204" pitchFamily="34" charset="0"/>
               </a:rPr>
-              <a:t>&gt;&gt;&lt;&gt;&gt;</a:t>
+              <a:t>&gt;&gt;&gt;&gt;&gt;</a:t>
             </a:r>
           </a:p>
         </p:txBody>
@@ -3639,7 +3647,7 @@
     </p:spTree>
     <p:extLst>
       <p:ext uri="{BB962C8B-B14F-4D97-AF65-F5344CB8AC3E}">
-        <p14:creationId xmlns:p14="http://schemas.microsoft.com/office/powerpoint/2010/main" val="1538526052"/>
+        <p14:creationId xmlns:p14="http://schemas.microsoft.com/office/powerpoint/2010/main" val="557106942"/>
       </p:ext>
     </p:extLst>
   </p:cSld>
@@ -3729,7 +3737,7 @@
                 <a:latin typeface="Helvetica" panose="020B0604020202020204" pitchFamily="34" charset="0"/>
                 <a:cs typeface="Helvetica" panose="020B0604020202020204" pitchFamily="34" charset="0"/>
               </a:rPr>
-              <a:t>&lt;&lt;&gt;&lt;&lt;</a:t>
+              <a:t>&gt;&gt;&lt;&gt;&gt;</a:t>
             </a:r>
           </a:p>
         </p:txBody>
@@ -3737,7 +3745,7 @@
     </p:spTree>
     <p:extLst>
       <p:ext uri="{BB962C8B-B14F-4D97-AF65-F5344CB8AC3E}">
-        <p14:creationId xmlns:p14="http://schemas.microsoft.com/office/powerpoint/2010/main" val="742953238"/>
+        <p14:creationId xmlns:p14="http://schemas.microsoft.com/office/powerpoint/2010/main" val="1538526052"/>
       </p:ext>
     </p:extLst>
   </p:cSld>
@@ -3827,8 +3835,113 @@
                 <a:latin typeface="Helvetica" panose="020B0604020202020204" pitchFamily="34" charset="0"/>
                 <a:cs typeface="Helvetica" panose="020B0604020202020204" pitchFamily="34" charset="0"/>
               </a:rPr>
+              <a:t>&lt;&lt;&gt;&lt;&lt;</a:t>
+            </a:r>
+          </a:p>
+        </p:txBody>
+      </p:sp>
+    </p:spTree>
+    <p:extLst>
+      <p:ext uri="{BB962C8B-B14F-4D97-AF65-F5344CB8AC3E}">
+        <p14:creationId xmlns:p14="http://schemas.microsoft.com/office/powerpoint/2010/main" val="742953238"/>
+      </p:ext>
+    </p:extLst>
+  </p:cSld>
+  <p:clrMapOvr>
+    <a:masterClrMapping/>
+  </p:clrMapOvr>
+  <p:timing>
+    <p:tnLst>
+      <p:par>
+        <p:cTn id="1" dur="indefinite" restart="never" nodeType="tmRoot"/>
+      </p:par>
+    </p:tnLst>
+  </p:timing>
+</p:sld>
+</file>
+
+<file path=ppt/slides/slide7.xml><?xml version="1.0" encoding="utf-8"?>
+<p:sld xmlns:a="http://schemas.openxmlformats.org/drawingml/2006/main" xmlns:r="http://schemas.openxmlformats.org/officeDocument/2006/relationships" xmlns:p="http://schemas.openxmlformats.org/presentationml/2006/main">
+  <p:cSld>
+    <p:spTree>
+      <p:nvGrpSpPr>
+        <p:cNvPr id="1" name=""/>
+        <p:cNvGrpSpPr/>
+        <p:nvPr/>
+      </p:nvGrpSpPr>
+      <p:grpSpPr>
+        <a:xfrm>
+          <a:off x="0" y="0"/>
+          <a:ext cx="0" cy="0"/>
+          <a:chOff x="0" y="0"/>
+          <a:chExt cx="0" cy="0"/>
+        </a:xfrm>
+      </p:grpSpPr>
+      <p:sp>
+        <p:nvSpPr>
+          <p:cNvPr id="2" name="Rectangle 1">
+            <a:extLst>
+              <a:ext uri="{FF2B5EF4-FFF2-40B4-BE49-F238E27FC236}">
+                <a16:creationId xmlns:a16="http://schemas.microsoft.com/office/drawing/2014/main" id="{55952CB0-2E38-B52B-3364-74D0EEF2753B}"/>
+              </a:ext>
+            </a:extLst>
+          </p:cNvPr>
+          <p:cNvSpPr/>
+          <p:nvPr/>
+        </p:nvSpPr>
+        <p:spPr>
+          <a:xfrm>
+            <a:off x="3086470" y="2190565"/>
+            <a:ext cx="6019060" cy="2476870"/>
+          </a:xfrm>
+          <a:prstGeom prst="rect">
+            <a:avLst/>
+          </a:prstGeom>
+          <a:solidFill>
+            <a:srgbClr val="BFBDBD"/>
+          </a:solidFill>
+          <a:ln>
+            <a:noFill/>
+          </a:ln>
+        </p:spPr>
+        <p:style>
+          <a:lnRef idx="2">
+            <a:schemeClr val="accent1">
+              <a:shade val="50000"/>
+            </a:schemeClr>
+          </a:lnRef>
+          <a:fillRef idx="1">
+            <a:schemeClr val="accent1"/>
+          </a:fillRef>
+          <a:effectRef idx="0">
+            <a:schemeClr val="accent1"/>
+          </a:effectRef>
+          <a:fontRef idx="minor">
+            <a:schemeClr val="lt1"/>
+          </a:fontRef>
+        </p:style>
+        <p:txBody>
+          <a:bodyPr rtlCol="0" anchor="ctr"/>
+          <a:lstStyle/>
+          <a:p>
+            <a:pPr algn="ctr"/>
+            <a:r>
+              <a:rPr lang="en-US" sz="8000" spc="600" smtClean="0">
+                <a:solidFill>
+                  <a:schemeClr val="tx1"/>
+                </a:solidFill>
+                <a:latin typeface="Helvetica" panose="020B0604020202020204" pitchFamily="34" charset="0"/>
+                <a:cs typeface="Helvetica" panose="020B0604020202020204" pitchFamily="34" charset="0"/>
+              </a:rPr>
               <a:t>++&gt;++</a:t>
             </a:r>
+            <a:endParaRPr lang="en-US" sz="8000" spc="600" dirty="0">
+              <a:solidFill>
+                <a:schemeClr val="tx1"/>
+              </a:solidFill>
+              <a:latin typeface="Helvetica" panose="020B0604020202020204" pitchFamily="34" charset="0"/>
+              <a:cs typeface="Helvetica" panose="020B0604020202020204" pitchFamily="34" charset="0"/>
+            </a:endParaRPr>
           </a:p>
         </p:txBody>
       </p:sp>
@@ -3852,7 +3965,7 @@
 </p:sld>
 </file>
 
-<file path=ppt/slides/slide7.xml><?xml version="1.0" encoding="utf-8"?>
+<file path=ppt/slides/slide8.xml><?xml version="1.0" encoding="utf-8"?>
 <p:sld xmlns:a="http://schemas.openxmlformats.org/drawingml/2006/main" xmlns:r="http://schemas.openxmlformats.org/officeDocument/2006/relationships" xmlns:p="http://schemas.openxmlformats.org/presentationml/2006/main">
   <p:cSld>
     <p:spTree>

</xml_diff>